<commit_message>
Minor updates to cost data and depreciation
</commit_message>
<xml_diff>
--- a/tech-regs-explanatory-chart.pptx
+++ b/tech-regs-explanatory-chart.pptx
@@ -5,11 +5,12 @@
     <p:sldMasterId id="2147483675" r:id="rId1"/>
   </p:sldMasterIdLst>
   <p:notesMasterIdLst>
-    <p:notesMasterId r:id="rId4"/>
+    <p:notesMasterId r:id="rId5"/>
   </p:notesMasterIdLst>
   <p:sldIdLst>
-    <p:sldId id="256" r:id="rId2"/>
-    <p:sldId id="257" r:id="rId3"/>
+    <p:sldId id="273" r:id="rId2"/>
+    <p:sldId id="256" r:id="rId3"/>
+    <p:sldId id="257" r:id="rId4"/>
   </p:sldIdLst>
   <p:sldSz cx="7977188" cy="7977188"/>
   <p:notesSz cx="6858000" cy="9144000"/>
@@ -198,7 +199,7 @@
           <a:p>
             <a:fld id="{0F9C1CCF-B725-44A7-AA57-5E433BD85C9F}" type="datetimeFigureOut">
               <a:rPr lang="en-US" smtClean="0"/>
-              <a:t>3/17/22</a:t>
+              <a:t>3/30/22</a:t>
             </a:fld>
             <a:endParaRPr lang="en-US"/>
           </a:p>
@@ -603,7 +604,7 @@
           <a:p>
             <a:fld id="{18BDFEC3-8487-43E8-A154-7C12CBC1FFF2}" type="slidenum">
               <a:rPr lang="en-US"/>
-              <a:t>1</a:t>
+              <a:t>2</a:t>
             </a:fld>
             <a:endParaRPr lang="en-US"/>
           </a:p>
@@ -915,7 +916,7 @@
           <a:p>
             <a:fld id="{862C827D-FC0C-184A-B855-165F1307D257}" type="datetimeFigureOut">
               <a:rPr lang="en-US" smtClean="0"/>
-              <a:t>3/17/22</a:t>
+              <a:t>3/30/22</a:t>
             </a:fld>
             <a:endParaRPr lang="en-US"/>
           </a:p>
@@ -1159,7 +1160,7 @@
           <a:p>
             <a:fld id="{862C827D-FC0C-184A-B855-165F1307D257}" type="datetimeFigureOut">
               <a:rPr lang="en-US" smtClean="0"/>
-              <a:t>3/17/22</a:t>
+              <a:t>3/30/22</a:t>
             </a:fld>
             <a:endParaRPr lang="en-US"/>
           </a:p>
@@ -1521,7 +1522,7 @@
           <a:p>
             <a:fld id="{C764DE79-268F-4C1A-8933-263129D2AF90}" type="datetimeFigureOut">
               <a:rPr lang="en-US" smtClean="0"/>
-              <a:t>3/17/22</a:t>
+              <a:t>3/30/22</a:t>
             </a:fld>
             <a:endParaRPr lang="en-US" dirty="0"/>
           </a:p>
@@ -1921,6 +1922,429 @@
       </p:grpSpPr>
       <p:sp>
         <p:nvSpPr>
+          <p:cNvPr id="2" name="Title 1">
+            <a:extLst>
+              <a:ext uri="{FF2B5EF4-FFF2-40B4-BE49-F238E27FC236}">
+                <a16:creationId xmlns:a16="http://schemas.microsoft.com/office/drawing/2014/main" id="{D502082F-69D2-2A45-A2BC-2AEDDCFC4BA1}"/>
+              </a:ext>
+            </a:extLst>
+          </p:cNvPr>
+          <p:cNvSpPr>
+            <a:spLocks noGrp="1"/>
+          </p:cNvSpPr>
+          <p:nvPr>
+            <p:ph type="title"/>
+          </p:nvPr>
+        </p:nvSpPr>
+        <p:spPr/>
+        <p:txBody>
+          <a:bodyPr>
+            <a:noAutofit/>
+          </a:bodyPr>
+          <a:lstStyle/>
+          <a:p>
+            <a:r>
+              <a:rPr lang="en-AU" sz="4800" dirty="0"/>
+              <a:t>Making diesel vehicles more efficient </a:t>
+            </a:r>
+          </a:p>
+        </p:txBody>
+      </p:sp>
+      <p:sp>
+        <p:nvSpPr>
+          <p:cNvPr id="3" name="Content Placeholder 2">
+            <a:extLst>
+              <a:ext uri="{FF2B5EF4-FFF2-40B4-BE49-F238E27FC236}">
+                <a16:creationId xmlns:a16="http://schemas.microsoft.com/office/drawing/2014/main" id="{6339255A-F443-7945-AEA8-06317F809FCA}"/>
+              </a:ext>
+            </a:extLst>
+          </p:cNvPr>
+          <p:cNvSpPr>
+            <a:spLocks noGrp="1"/>
+          </p:cNvSpPr>
+          <p:nvPr>
+            <p:ph sz="half" idx="1"/>
+          </p:nvPr>
+        </p:nvSpPr>
+        <p:spPr/>
+        <p:txBody>
+          <a:bodyPr>
+            <a:normAutofit/>
+          </a:bodyPr>
+          <a:lstStyle/>
+          <a:p>
+            <a:endParaRPr lang="en-AU" sz="4400"/>
+          </a:p>
+        </p:txBody>
+      </p:sp>
+      <p:sp>
+        <p:nvSpPr>
+          <p:cNvPr id="6" name="Rounded Rectangle 5">
+            <a:extLst>
+              <a:ext uri="{FF2B5EF4-FFF2-40B4-BE49-F238E27FC236}">
+                <a16:creationId xmlns:a16="http://schemas.microsoft.com/office/drawing/2014/main" id="{E8FF7013-9F21-DE4D-AF14-7C6FE2798B8D}"/>
+              </a:ext>
+            </a:extLst>
+          </p:cNvPr>
+          <p:cNvSpPr/>
+          <p:nvPr/>
+        </p:nvSpPr>
+        <p:spPr>
+          <a:xfrm>
+            <a:off x="195873" y="848411"/>
+            <a:ext cx="7585442" cy="6711885"/>
+          </a:xfrm>
+          <a:prstGeom prst="roundRect">
+            <a:avLst>
+              <a:gd name="adj" fmla="val 2938"/>
+            </a:avLst>
+          </a:prstGeom>
+          <a:solidFill>
+            <a:schemeClr val="bg1">
+              <a:lumMod val="85000"/>
+              <a:alpha val="24000"/>
+            </a:schemeClr>
+          </a:solidFill>
+          <a:ln>
+            <a:noFill/>
+          </a:ln>
+        </p:spPr>
+        <p:style>
+          <a:lnRef idx="2">
+            <a:schemeClr val="accent1">
+              <a:shade val="50000"/>
+            </a:schemeClr>
+          </a:lnRef>
+          <a:fillRef idx="1">
+            <a:schemeClr val="accent1"/>
+          </a:fillRef>
+          <a:effectRef idx="0">
+            <a:schemeClr val="accent1"/>
+          </a:effectRef>
+          <a:fontRef idx="minor">
+            <a:schemeClr val="lt1"/>
+          </a:fontRef>
+        </p:style>
+        <p:txBody>
+          <a:bodyPr rtlCol="0" anchor="ctr"/>
+          <a:lstStyle/>
+          <a:p>
+            <a:pPr algn="ctr"/>
+            <a:endParaRPr lang="en-AU" sz="2800" dirty="0">
+              <a:latin typeface="Arial" panose="020B0604020202020204" pitchFamily="34" charset="0"/>
+              <a:cs typeface="Arial" panose="020B0604020202020204" pitchFamily="34" charset="0"/>
+            </a:endParaRPr>
+          </a:p>
+        </p:txBody>
+      </p:sp>
+      <p:sp>
+        <p:nvSpPr>
+          <p:cNvPr id="8" name="TextBox 7">
+            <a:extLst>
+              <a:ext uri="{FF2B5EF4-FFF2-40B4-BE49-F238E27FC236}">
+                <a16:creationId xmlns:a16="http://schemas.microsoft.com/office/drawing/2014/main" id="{C92D0856-18D2-5745-BD33-6B372A9CB43B}"/>
+              </a:ext>
+            </a:extLst>
+          </p:cNvPr>
+          <p:cNvSpPr txBox="1"/>
+          <p:nvPr/>
+        </p:nvSpPr>
+        <p:spPr>
+          <a:xfrm>
+            <a:off x="5124817" y="60795"/>
+            <a:ext cx="2296239" cy="707886"/>
+          </a:xfrm>
+          <a:prstGeom prst="rect">
+            <a:avLst/>
+          </a:prstGeom>
+          <a:noFill/>
+        </p:spPr>
+        <p:txBody>
+          <a:bodyPr wrap="square" rtlCol="0">
+            <a:spAutoFit/>
+          </a:bodyPr>
+          <a:lstStyle/>
+          <a:p>
+            <a:pPr algn="ctr"/>
+            <a:r>
+              <a:rPr lang="en-AU" sz="2000" b="1" dirty="0">
+                <a:solidFill>
+                  <a:srgbClr val="3C81CD"/>
+                </a:solidFill>
+                <a:latin typeface="Arial" panose="020B0604020202020204" pitchFamily="34" charset="0"/>
+                <a:cs typeface="Arial" panose="020B0604020202020204" pitchFamily="34" charset="0"/>
+              </a:rPr>
+              <a:t>Tyre and engine regulations</a:t>
+            </a:r>
+          </a:p>
+        </p:txBody>
+      </p:sp>
+      <p:cxnSp>
+        <p:nvCxnSpPr>
+          <p:cNvPr id="9" name="Straight Arrow Connector 8">
+            <a:extLst>
+              <a:ext uri="{FF2B5EF4-FFF2-40B4-BE49-F238E27FC236}">
+                <a16:creationId xmlns:a16="http://schemas.microsoft.com/office/drawing/2014/main" id="{882F11A0-6A69-7545-8BD2-5DEEAAC70092}"/>
+              </a:ext>
+            </a:extLst>
+          </p:cNvPr>
+          <p:cNvCxnSpPr>
+            <a:cxnSpLocks/>
+          </p:cNvCxnSpPr>
+          <p:nvPr/>
+        </p:nvCxnSpPr>
+        <p:spPr>
+          <a:xfrm flipV="1">
+            <a:off x="1536569" y="1941922"/>
+            <a:ext cx="4458878" cy="4411744"/>
+          </a:xfrm>
+          <a:prstGeom prst="straightConnector1">
+            <a:avLst/>
+          </a:prstGeom>
+          <a:ln w="28575">
+            <a:solidFill>
+              <a:schemeClr val="tx1">
+                <a:lumMod val="50000"/>
+                <a:lumOff val="50000"/>
+              </a:schemeClr>
+            </a:solidFill>
+            <a:headEnd type="triangle"/>
+            <a:tailEnd type="triangle"/>
+          </a:ln>
+        </p:spPr>
+        <p:style>
+          <a:lnRef idx="1">
+            <a:schemeClr val="accent1"/>
+          </a:lnRef>
+          <a:fillRef idx="0">
+            <a:schemeClr val="accent1"/>
+          </a:fillRef>
+          <a:effectRef idx="0">
+            <a:schemeClr val="accent1"/>
+          </a:effectRef>
+          <a:fontRef idx="minor">
+            <a:schemeClr val="tx1"/>
+          </a:fontRef>
+        </p:style>
+      </p:cxnSp>
+      <p:sp>
+        <p:nvSpPr>
+          <p:cNvPr id="10" name="TextBox 9">
+            <a:extLst>
+              <a:ext uri="{FF2B5EF4-FFF2-40B4-BE49-F238E27FC236}">
+                <a16:creationId xmlns:a16="http://schemas.microsoft.com/office/drawing/2014/main" id="{BD9F34DC-561B-E844-89BF-A4417DEA74B1}"/>
+              </a:ext>
+            </a:extLst>
+          </p:cNvPr>
+          <p:cNvSpPr txBox="1"/>
+          <p:nvPr/>
+        </p:nvSpPr>
+        <p:spPr>
+          <a:xfrm>
+            <a:off x="556132" y="1520533"/>
+            <a:ext cx="2696787" cy="1015663"/>
+          </a:xfrm>
+          <a:prstGeom prst="rect">
+            <a:avLst/>
+          </a:prstGeom>
+          <a:noFill/>
+        </p:spPr>
+        <p:txBody>
+          <a:bodyPr wrap="square" rtlCol="0">
+            <a:spAutoFit/>
+          </a:bodyPr>
+          <a:lstStyle/>
+          <a:p>
+            <a:pPr marL="186966" indent="-186966">
+              <a:buClr>
+                <a:schemeClr val="accent2"/>
+              </a:buClr>
+              <a:buSzPct val="120000"/>
+              <a:buFont typeface="Arial" panose="020B0604020202020204" pitchFamily="34" charset="0"/>
+              <a:buChar char="•"/>
+            </a:pPr>
+            <a:r>
+              <a:rPr lang="en-AU" sz="2000" dirty="0">
+                <a:latin typeface="Arial" panose="020B0604020202020204" pitchFamily="34" charset="0"/>
+                <a:cs typeface="Arial" panose="020B0604020202020204" pitchFamily="34" charset="0"/>
+              </a:rPr>
+              <a:t>More technology options</a:t>
+            </a:r>
+          </a:p>
+          <a:p>
+            <a:pPr marL="186966" indent="-186966">
+              <a:buClr>
+                <a:schemeClr val="accent2"/>
+              </a:buClr>
+              <a:buSzPct val="120000"/>
+              <a:buFont typeface="Arial" panose="020B0604020202020204" pitchFamily="34" charset="0"/>
+              <a:buChar char="•"/>
+            </a:pPr>
+            <a:endParaRPr lang="en-AU" sz="2000" dirty="0">
+              <a:latin typeface="Arial" panose="020B0604020202020204" pitchFamily="34" charset="0"/>
+              <a:cs typeface="Arial" panose="020B0604020202020204" pitchFamily="34" charset="0"/>
+            </a:endParaRPr>
+          </a:p>
+        </p:txBody>
+      </p:sp>
+      <p:sp>
+        <p:nvSpPr>
+          <p:cNvPr id="11" name="TextBox 10">
+            <a:extLst>
+              <a:ext uri="{FF2B5EF4-FFF2-40B4-BE49-F238E27FC236}">
+                <a16:creationId xmlns:a16="http://schemas.microsoft.com/office/drawing/2014/main" id="{B2EF2B6D-16EB-4E41-8BB1-CCFE87195A09}"/>
+              </a:ext>
+            </a:extLst>
+          </p:cNvPr>
+          <p:cNvSpPr txBox="1"/>
+          <p:nvPr/>
+        </p:nvSpPr>
+        <p:spPr>
+          <a:xfrm>
+            <a:off x="565313" y="3742012"/>
+            <a:ext cx="2696787" cy="1938992"/>
+          </a:xfrm>
+          <a:prstGeom prst="rect">
+            <a:avLst/>
+          </a:prstGeom>
+          <a:noFill/>
+        </p:spPr>
+        <p:txBody>
+          <a:bodyPr wrap="square" rtlCol="0">
+            <a:spAutoFit/>
+          </a:bodyPr>
+          <a:lstStyle/>
+          <a:p>
+            <a:pPr marL="186966" indent="-186966">
+              <a:buClr>
+                <a:schemeClr val="accent2"/>
+              </a:buClr>
+              <a:buSzPct val="120000"/>
+              <a:buFont typeface="Arial" panose="020B0604020202020204" pitchFamily="34" charset="0"/>
+              <a:buChar char="•"/>
+            </a:pPr>
+            <a:r>
+              <a:rPr lang="en-AU" sz="2000" dirty="0">
+                <a:latin typeface="Arial" panose="020B0604020202020204" pitchFamily="34" charset="0"/>
+                <a:cs typeface="Arial" panose="020B0604020202020204" pitchFamily="34" charset="0"/>
+              </a:rPr>
+              <a:t>Expensive vehicle testing: need to test whole vehicle</a:t>
+            </a:r>
+          </a:p>
+          <a:p>
+            <a:pPr marL="186966" indent="-186966">
+              <a:buClr>
+                <a:schemeClr val="accent2"/>
+              </a:buClr>
+              <a:buSzPct val="120000"/>
+              <a:buFont typeface="Arial" panose="020B0604020202020204" pitchFamily="34" charset="0"/>
+              <a:buChar char="•"/>
+            </a:pPr>
+            <a:endParaRPr lang="en-AU" sz="2000" dirty="0">
+              <a:latin typeface="Arial" panose="020B0604020202020204" pitchFamily="34" charset="0"/>
+              <a:cs typeface="Arial" panose="020B0604020202020204" pitchFamily="34" charset="0"/>
+            </a:endParaRPr>
+          </a:p>
+          <a:p>
+            <a:pPr marL="186966" indent="-186966">
+              <a:buClr>
+                <a:schemeClr val="accent2"/>
+              </a:buClr>
+              <a:buSzPct val="120000"/>
+              <a:buFont typeface="Arial" panose="020B0604020202020204" pitchFamily="34" charset="0"/>
+              <a:buChar char="•"/>
+            </a:pPr>
+            <a:r>
+              <a:rPr lang="en-AU" sz="2000" dirty="0">
+                <a:latin typeface="Arial" panose="020B0604020202020204" pitchFamily="34" charset="0"/>
+                <a:cs typeface="Arial" panose="020B0604020202020204" pitchFamily="34" charset="0"/>
+              </a:rPr>
+              <a:t>Long lead times: complex to set up</a:t>
+            </a:r>
+          </a:p>
+        </p:txBody>
+      </p:sp>
+      <p:sp>
+        <p:nvSpPr>
+          <p:cNvPr id="14" name="TextBox 13">
+            <a:extLst>
+              <a:ext uri="{FF2B5EF4-FFF2-40B4-BE49-F238E27FC236}">
+                <a16:creationId xmlns:a16="http://schemas.microsoft.com/office/drawing/2014/main" id="{50028073-99FD-744F-B16E-C4A67FA644A9}"/>
+              </a:ext>
+            </a:extLst>
+          </p:cNvPr>
+          <p:cNvSpPr txBox="1"/>
+          <p:nvPr/>
+        </p:nvSpPr>
+        <p:spPr>
+          <a:xfrm>
+            <a:off x="434395" y="214683"/>
+            <a:ext cx="2417977" cy="400110"/>
+          </a:xfrm>
+          <a:prstGeom prst="rect">
+            <a:avLst/>
+          </a:prstGeom>
+          <a:noFill/>
+        </p:spPr>
+        <p:txBody>
+          <a:bodyPr wrap="square" rtlCol="0">
+            <a:spAutoFit/>
+          </a:bodyPr>
+          <a:lstStyle/>
+          <a:p>
+            <a:pPr algn="ctr"/>
+            <a:r>
+              <a:rPr lang="en-AU" sz="2000" b="1" dirty="0">
+                <a:solidFill>
+                  <a:schemeClr val="accent2"/>
+                </a:solidFill>
+                <a:latin typeface="Arial" panose="020B0604020202020204" pitchFamily="34" charset="0"/>
+                <a:cs typeface="Arial" panose="020B0604020202020204" pitchFamily="34" charset="0"/>
+              </a:rPr>
+              <a:t>Emissions ceiling</a:t>
+            </a:r>
+            <a:endParaRPr lang="en-AU" sz="2000" dirty="0">
+              <a:solidFill>
+                <a:schemeClr val="accent2"/>
+              </a:solidFill>
+              <a:latin typeface="Arial" panose="020B0604020202020204" pitchFamily="34" charset="0"/>
+              <a:cs typeface="Arial" panose="020B0604020202020204" pitchFamily="34" charset="0"/>
+            </a:endParaRPr>
+          </a:p>
+        </p:txBody>
+      </p:sp>
+    </p:spTree>
+    <p:extLst>
+      <p:ext uri="{BB962C8B-B14F-4D97-AF65-F5344CB8AC3E}">
+        <p14:creationId xmlns:p14="http://schemas.microsoft.com/office/powerpoint/2010/main" val="2427921962"/>
+      </p:ext>
+    </p:extLst>
+  </p:cSld>
+  <p:clrMapOvr>
+    <a:masterClrMapping/>
+  </p:clrMapOvr>
+</p:sld>
+</file>
+
+<file path=ppt/slides/slide2.xml><?xml version="1.0" encoding="utf-8"?>
+<p:sld xmlns:a="http://schemas.openxmlformats.org/drawingml/2006/main" xmlns:r="http://schemas.openxmlformats.org/officeDocument/2006/relationships" xmlns:p="http://schemas.openxmlformats.org/presentationml/2006/main">
+  <p:cSld>
+    <p:spTree>
+      <p:nvGrpSpPr>
+        <p:cNvPr id="1" name=""/>
+        <p:cNvGrpSpPr/>
+        <p:nvPr/>
+      </p:nvGrpSpPr>
+      <p:grpSpPr>
+        <a:xfrm>
+          <a:off x="0" y="0"/>
+          <a:ext cx="0" cy="0"/>
+          <a:chOff x="0" y="0"/>
+          <a:chExt cx="0" cy="0"/>
+        </a:xfrm>
+      </p:grpSpPr>
+      <p:sp>
+        <p:nvSpPr>
           <p:cNvPr id="97" name="Rounded Rectangle 96">
             <a:extLst>
               <a:ext uri="{FF2B5EF4-FFF2-40B4-BE49-F238E27FC236}">
@@ -3014,7 +3438,7 @@
 </p:sld>
 </file>
 
-<file path=ppt/slides/slide2.xml><?xml version="1.0" encoding="utf-8"?>
+<file path=ppt/slides/slide3.xml><?xml version="1.0" encoding="utf-8"?>
 <p:sld xmlns:a="http://schemas.openxmlformats.org/drawingml/2006/main" xmlns:r="http://schemas.openxmlformats.org/officeDocument/2006/relationships" xmlns:p="http://schemas.openxmlformats.org/presentationml/2006/main">
   <p:cSld>
     <p:spTree>
@@ -3095,8 +3519,8 @@
         </p:nvSpPr>
         <p:spPr>
           <a:xfrm>
-            <a:off x="141528" y="1411259"/>
-            <a:ext cx="7747686" cy="4791284"/>
+            <a:off x="141528" y="509048"/>
+            <a:ext cx="7747686" cy="6551628"/>
           </a:xfrm>
           <a:prstGeom prst="roundRect">
             <a:avLst>
@@ -3155,8 +3579,8 @@
         </p:nvSpPr>
         <p:spPr>
           <a:xfrm>
-            <a:off x="-98627" y="1455116"/>
-            <a:ext cx="3107925" cy="338554"/>
+            <a:off x="4727735" y="944413"/>
+            <a:ext cx="3107925" cy="584775"/>
           </a:xfrm>
           <a:prstGeom prst="rect">
             <a:avLst/>
@@ -3173,12 +3597,31 @@
             <a:r>
               <a:rPr lang="en-AU" sz="1600" b="1" dirty="0">
                 <a:solidFill>
-                  <a:schemeClr val="accent2"/>
+                  <a:schemeClr val="tx1">
+                    <a:lumMod val="50000"/>
+                    <a:lumOff val="50000"/>
+                  </a:schemeClr>
                 </a:solidFill>
                 <a:latin typeface="Arial" panose="020B0604020202020204" pitchFamily="34" charset="0"/>
                 <a:cs typeface="Arial" panose="020B0604020202020204" pitchFamily="34" charset="0"/>
               </a:rPr>
-              <a:t>Emissions ceiling</a:t>
+              <a:t>Emissions</a:t>
+            </a:r>
+          </a:p>
+          <a:p>
+            <a:pPr algn="ctr"/>
+            <a:r>
+              <a:rPr lang="en-AU" sz="1600" b="1" dirty="0">
+                <a:solidFill>
+                  <a:schemeClr val="tx1">
+                    <a:lumMod val="50000"/>
+                    <a:lumOff val="50000"/>
+                  </a:schemeClr>
+                </a:solidFill>
+                <a:latin typeface="Arial" panose="020B0604020202020204" pitchFamily="34" charset="0"/>
+                <a:cs typeface="Arial" panose="020B0604020202020204" pitchFamily="34" charset="0"/>
+              </a:rPr>
+              <a:t>ceiling</a:t>
             </a:r>
           </a:p>
         </p:txBody>
@@ -3197,8 +3640,8 @@
         </p:nvSpPr>
         <p:spPr>
           <a:xfrm>
-            <a:off x="4786928" y="1455116"/>
-            <a:ext cx="2951450" cy="338554"/>
+            <a:off x="368269" y="5702902"/>
+            <a:ext cx="2951450" cy="584775"/>
           </a:xfrm>
           <a:prstGeom prst="rect">
             <a:avLst/>
@@ -3214,13 +3657,20 @@
             <a:pPr algn="ctr"/>
             <a:r>
               <a:rPr lang="en-AU" sz="1600" b="1" dirty="0">
-                <a:solidFill>
-                  <a:schemeClr val="accent6"/>
-                </a:solidFill>
-                <a:latin typeface="Arial" panose="020B0604020202020204" pitchFamily="34" charset="0"/>
-                <a:cs typeface="Arial" panose="020B0604020202020204" pitchFamily="34" charset="0"/>
-              </a:rPr>
-              <a:t>Tyre and engine regulations</a:t>
+                <a:latin typeface="Arial" panose="020B0604020202020204" pitchFamily="34" charset="0"/>
+                <a:cs typeface="Arial" panose="020B0604020202020204" pitchFamily="34" charset="0"/>
+              </a:rPr>
+              <a:t>Tyre and engine</a:t>
+            </a:r>
+          </a:p>
+          <a:p>
+            <a:pPr algn="ctr"/>
+            <a:r>
+              <a:rPr lang="en-AU" sz="1600" b="1" dirty="0">
+                <a:latin typeface="Arial" panose="020B0604020202020204" pitchFamily="34" charset="0"/>
+                <a:cs typeface="Arial" panose="020B0604020202020204" pitchFamily="34" charset="0"/>
+              </a:rPr>
+              <a:t>regulations</a:t>
             </a:r>
           </a:p>
         </p:txBody>
@@ -3234,13 +3684,15 @@
               </a:ext>
             </a:extLst>
           </p:cNvPr>
-          <p:cNvCxnSpPr/>
+          <p:cNvCxnSpPr>
+            <a:cxnSpLocks/>
+          </p:cNvCxnSpPr>
           <p:nvPr/>
         </p:nvCxnSpPr>
         <p:spPr>
-          <a:xfrm>
-            <a:off x="654908" y="3719384"/>
-            <a:ext cx="6549081" cy="0"/>
+          <a:xfrm flipV="1">
+            <a:off x="1966542" y="1593130"/>
+            <a:ext cx="3817856" cy="3921550"/>
           </a:xfrm>
           <a:prstGeom prst="straightConnector1">
             <a:avLst/>
@@ -3285,8 +3737,8 @@
         </p:nvSpPr>
         <p:spPr>
           <a:xfrm>
-            <a:off x="329831" y="2094807"/>
-            <a:ext cx="3420873" cy="1323439"/>
+            <a:off x="2019444" y="3235117"/>
+            <a:ext cx="2087957" cy="584775"/>
           </a:xfrm>
           <a:prstGeom prst="rect">
             <a:avLst/>
@@ -3309,12 +3761,44 @@
             </a:pPr>
             <a:r>
               <a:rPr lang="en-AU" sz="1600" dirty="0">
-                <a:latin typeface="Arial" panose="020B0604020202020204" pitchFamily="34" charset="0"/>
-                <a:cs typeface="Arial" panose="020B0604020202020204" pitchFamily="34" charset="0"/>
-              </a:rPr>
-              <a:t>More flexibility for manufacturers: a greater range of technology options</a:t>
-            </a:r>
-          </a:p>
+                <a:solidFill>
+                  <a:schemeClr val="accent2"/>
+                </a:solidFill>
+                <a:latin typeface="Arial" panose="020B0604020202020204" pitchFamily="34" charset="0"/>
+                <a:cs typeface="Arial" panose="020B0604020202020204" pitchFamily="34" charset="0"/>
+              </a:rPr>
+              <a:t>Technology options</a:t>
+            </a:r>
+          </a:p>
+        </p:txBody>
+      </p:sp>
+      <p:sp>
+        <p:nvSpPr>
+          <p:cNvPr id="14" name="TextBox 13">
+            <a:extLst>
+              <a:ext uri="{FF2B5EF4-FFF2-40B4-BE49-F238E27FC236}">
+                <a16:creationId xmlns:a16="http://schemas.microsoft.com/office/drawing/2014/main" id="{179E7611-6D7A-3D41-8E3C-CB99C8ACB8FA}"/>
+              </a:ext>
+            </a:extLst>
+          </p:cNvPr>
+          <p:cNvSpPr txBox="1"/>
+          <p:nvPr/>
+        </p:nvSpPr>
+        <p:spPr>
+          <a:xfrm>
+            <a:off x="4466290" y="3112007"/>
+            <a:ext cx="3420873" cy="830997"/>
+          </a:xfrm>
+          <a:prstGeom prst="rect">
+            <a:avLst/>
+          </a:prstGeom>
+          <a:noFill/>
+        </p:spPr>
+        <p:txBody>
+          <a:bodyPr wrap="square" rtlCol="0">
+            <a:spAutoFit/>
+          </a:bodyPr>
+          <a:lstStyle/>
           <a:p>
             <a:pPr marL="285750" indent="-285750">
               <a:buClr>
@@ -3326,41 +3810,15 @@
             </a:pPr>
             <a:r>
               <a:rPr lang="en-AU" sz="1600" dirty="0">
-                <a:latin typeface="Arial" panose="020B0604020202020204" pitchFamily="34" charset="0"/>
-                <a:cs typeface="Arial" panose="020B0604020202020204" pitchFamily="34" charset="0"/>
-              </a:rPr>
-              <a:t>Bigger overall reductions to emissions achievable </a:t>
-            </a:r>
-          </a:p>
-        </p:txBody>
-      </p:sp>
-      <p:sp>
-        <p:nvSpPr>
-          <p:cNvPr id="11" name="TextBox 10">
-            <a:extLst>
-              <a:ext uri="{FF2B5EF4-FFF2-40B4-BE49-F238E27FC236}">
-                <a16:creationId xmlns:a16="http://schemas.microsoft.com/office/drawing/2014/main" id="{EACF4900-ED6A-2C45-AEFA-FE356CDD77AC}"/>
-              </a:ext>
-            </a:extLst>
-          </p:cNvPr>
-          <p:cNvSpPr txBox="1"/>
-          <p:nvPr/>
-        </p:nvSpPr>
-        <p:spPr>
-          <a:xfrm>
-            <a:off x="329831" y="4064866"/>
-            <a:ext cx="3420873" cy="1323439"/>
-          </a:xfrm>
-          <a:prstGeom prst="rect">
-            <a:avLst/>
-          </a:prstGeom>
-          <a:noFill/>
-        </p:spPr>
-        <p:txBody>
-          <a:bodyPr wrap="square" rtlCol="0">
-            <a:spAutoFit/>
-          </a:bodyPr>
-          <a:lstStyle/>
+                <a:solidFill>
+                  <a:schemeClr val="tx2"/>
+                </a:solidFill>
+                <a:latin typeface="Arial" panose="020B0604020202020204" pitchFamily="34" charset="0"/>
+                <a:cs typeface="Arial" panose="020B0604020202020204" pitchFamily="34" charset="0"/>
+              </a:rPr>
+              <a:t>Implementation cost</a:t>
+            </a:r>
+          </a:p>
           <a:p>
             <a:pPr marL="285750" indent="-285750">
               <a:buClr>
@@ -3370,13 +3828,13 @@
               <a:buFont typeface="Arial" panose="020B0604020202020204" pitchFamily="34" charset="0"/>
               <a:buChar char="•"/>
             </a:pPr>
-            <a:r>
-              <a:rPr lang="en-AU" sz="1600" dirty="0">
-                <a:latin typeface="Arial" panose="020B0604020202020204" pitchFamily="34" charset="0"/>
-                <a:cs typeface="Arial" panose="020B0604020202020204" pitchFamily="34" charset="0"/>
-              </a:rPr>
-              <a:t>More comprehensive vehicle testing needed, with higher costs</a:t>
-            </a:r>
+            <a:endParaRPr lang="en-AU" sz="1600" dirty="0">
+              <a:solidFill>
+                <a:schemeClr val="tx2"/>
+              </a:solidFill>
+              <a:latin typeface="Arial" panose="020B0604020202020204" pitchFamily="34" charset="0"/>
+              <a:cs typeface="Arial" panose="020B0604020202020204" pitchFamily="34" charset="0"/>
+            </a:endParaRPr>
           </a:p>
           <a:p>
             <a:pPr marL="285750" indent="-285750">
@@ -3389,20 +3847,23 @@
             </a:pPr>
             <a:r>
               <a:rPr lang="en-AU" sz="1600" dirty="0">
-                <a:latin typeface="Arial" panose="020B0604020202020204" pitchFamily="34" charset="0"/>
-                <a:cs typeface="Arial" panose="020B0604020202020204" pitchFamily="34" charset="0"/>
-              </a:rPr>
-              <a:t>Longer lead times needed to set up a scheme</a:t>
-            </a:r>
-          </a:p>
-        </p:txBody>
-      </p:sp>
-      <p:sp>
-        <p:nvSpPr>
-          <p:cNvPr id="12" name="TextBox 11">
+                <a:solidFill>
+                  <a:schemeClr val="tx2"/>
+                </a:solidFill>
+                <a:latin typeface="Arial" panose="020B0604020202020204" pitchFamily="34" charset="0"/>
+                <a:cs typeface="Arial" panose="020B0604020202020204" pitchFamily="34" charset="0"/>
+              </a:rPr>
+              <a:t>Policy complexity</a:t>
+            </a:r>
+          </a:p>
+        </p:txBody>
+      </p:sp>
+      <p:sp>
+        <p:nvSpPr>
+          <p:cNvPr id="17" name="TextBox 16">
             <a:extLst>
               <a:ext uri="{FF2B5EF4-FFF2-40B4-BE49-F238E27FC236}">
-                <a16:creationId xmlns:a16="http://schemas.microsoft.com/office/drawing/2014/main" id="{95CF049A-DA99-AA42-B00C-07453CAA0ACF}"/>
+                <a16:creationId xmlns:a16="http://schemas.microsoft.com/office/drawing/2014/main" id="{C2F472D3-261E-2043-857B-47CE5C7F4DB4}"/>
               </a:ext>
             </a:extLst>
           </p:cNvPr>
@@ -3411,8 +3872,8 @@
         </p:nvSpPr>
         <p:spPr>
           <a:xfrm>
-            <a:off x="4482173" y="1940509"/>
-            <a:ext cx="3420873" cy="1323439"/>
+            <a:off x="-279676" y="5060600"/>
+            <a:ext cx="2951450" cy="276999"/>
           </a:xfrm>
           <a:prstGeom prst="rect">
             <a:avLst/>
@@ -3425,61 +3886,29 @@
           </a:bodyPr>
           <a:lstStyle/>
           <a:p>
-            <a:pPr marL="285750" indent="-285750">
-              <a:buClr>
-                <a:schemeClr val="accent6"/>
-              </a:buClr>
-              <a:buSzPct val="120000"/>
-              <a:buFont typeface="Arial" panose="020B0604020202020204" pitchFamily="34" charset="0"/>
-              <a:buChar char="•"/>
-            </a:pPr>
-            <a:r>
-              <a:rPr lang="en-AU" sz="1600" dirty="0">
-                <a:latin typeface="Arial" panose="020B0604020202020204" pitchFamily="34" charset="0"/>
-                <a:cs typeface="Arial" panose="020B0604020202020204" pitchFamily="34" charset="0"/>
-              </a:rPr>
-              <a:t>Manufacturers must improve tyres and engines specifically</a:t>
-            </a:r>
-          </a:p>
-          <a:p>
-            <a:pPr marL="285750" indent="-285750">
-              <a:buClr>
-                <a:schemeClr val="accent6"/>
-              </a:buClr>
-              <a:buSzPct val="120000"/>
-              <a:buFont typeface="Arial" panose="020B0604020202020204" pitchFamily="34" charset="0"/>
-              <a:buChar char="•"/>
-            </a:pPr>
-            <a:r>
-              <a:rPr lang="en-AU" sz="1600" dirty="0">
-                <a:latin typeface="Arial" panose="020B0604020202020204" pitchFamily="34" charset="0"/>
-                <a:cs typeface="Arial" panose="020B0604020202020204" pitchFamily="34" charset="0"/>
-              </a:rPr>
-              <a:t>Lower overall reductions in CO2 possible</a:t>
-            </a:r>
-          </a:p>
-          <a:p>
-            <a:pPr marL="285750" indent="-285750">
-              <a:buClr>
-                <a:schemeClr val="accent6"/>
-              </a:buClr>
-              <a:buSzPct val="120000"/>
-              <a:buFont typeface="Arial" panose="020B0604020202020204" pitchFamily="34" charset="0"/>
-              <a:buChar char="•"/>
-            </a:pPr>
-            <a:endParaRPr lang="en-AU" sz="1600" dirty="0">
-              <a:latin typeface="Arial" panose="020B0604020202020204" pitchFamily="34" charset="0"/>
-              <a:cs typeface="Arial" panose="020B0604020202020204" pitchFamily="34" charset="0"/>
-            </a:endParaRPr>
-          </a:p>
-        </p:txBody>
-      </p:sp>
-      <p:sp>
-        <p:nvSpPr>
-          <p:cNvPr id="13" name="TextBox 12">
+            <a:pPr algn="ctr"/>
+            <a:r>
+              <a:rPr lang="en-AU" sz="1200" dirty="0">
+                <a:solidFill>
+                  <a:schemeClr val="tx1">
+                    <a:lumMod val="50000"/>
+                    <a:lumOff val="50000"/>
+                  </a:schemeClr>
+                </a:solidFill>
+                <a:latin typeface="Arial" panose="020B0604020202020204" pitchFamily="34" charset="0"/>
+                <a:cs typeface="Arial" panose="020B0604020202020204" pitchFamily="34" charset="0"/>
+              </a:rPr>
+              <a:t>Testing less of the vehicle</a:t>
+            </a:r>
+          </a:p>
+        </p:txBody>
+      </p:sp>
+      <p:sp>
+        <p:nvSpPr>
+          <p:cNvPr id="18" name="TextBox 17">
             <a:extLst>
               <a:ext uri="{FF2B5EF4-FFF2-40B4-BE49-F238E27FC236}">
-                <a16:creationId xmlns:a16="http://schemas.microsoft.com/office/drawing/2014/main" id="{168FA796-C869-E843-BCAD-BC411E3128E1}"/>
+                <a16:creationId xmlns:a16="http://schemas.microsoft.com/office/drawing/2014/main" id="{5ED6D0F3-F64B-AF4A-8F86-79F8465D939A}"/>
               </a:ext>
             </a:extLst>
           </p:cNvPr>
@@ -3488,8 +3917,8 @@
         </p:nvSpPr>
         <p:spPr>
           <a:xfrm>
-            <a:off x="4414787" y="4051521"/>
-            <a:ext cx="3420873" cy="1077218"/>
+            <a:off x="2990565" y="1440411"/>
+            <a:ext cx="2951450" cy="276999"/>
           </a:xfrm>
           <a:prstGeom prst="rect">
             <a:avLst/>
@@ -3502,80 +3931,20 @@
           </a:bodyPr>
           <a:lstStyle/>
           <a:p>
-            <a:pPr marL="285750" indent="-285750">
-              <a:buClr>
-                <a:schemeClr val="accent6"/>
-              </a:buClr>
-              <a:buSzPct val="120000"/>
-              <a:buFont typeface="Arial" panose="020B0604020202020204" pitchFamily="34" charset="0"/>
-              <a:buChar char="•"/>
-            </a:pPr>
-            <a:r>
-              <a:rPr lang="en-AU" sz="1600" dirty="0">
-                <a:latin typeface="Arial" panose="020B0604020202020204" pitchFamily="34" charset="0"/>
-                <a:cs typeface="Arial" panose="020B0604020202020204" pitchFamily="34" charset="0"/>
-              </a:rPr>
-              <a:t>Far </a:t>
-            </a:r>
-            <a:r>
-              <a:rPr lang="en-AU" sz="1600" dirty="0" err="1">
-                <a:latin typeface="Arial" panose="020B0604020202020204" pitchFamily="34" charset="0"/>
-                <a:cs typeface="Arial" panose="020B0604020202020204" pitchFamily="34" charset="0"/>
-              </a:rPr>
-              <a:t>chepaer</a:t>
-            </a:r>
-            <a:r>
-              <a:rPr lang="en-AU" sz="1600" dirty="0">
-                <a:latin typeface="Arial" panose="020B0604020202020204" pitchFamily="34" charset="0"/>
-                <a:cs typeface="Arial" panose="020B0604020202020204" pitchFamily="34" charset="0"/>
-              </a:rPr>
-              <a:t> </a:t>
-            </a:r>
-            <a:r>
-              <a:rPr lang="en-AU" sz="1600" dirty="0" err="1">
-                <a:latin typeface="Arial" panose="020B0604020202020204" pitchFamily="34" charset="0"/>
-                <a:cs typeface="Arial" panose="020B0604020202020204" pitchFamily="34" charset="0"/>
-              </a:rPr>
-              <a:t>ve</a:t>
-            </a:r>
-            <a:r>
-              <a:rPr lang="en-AU" sz="1600" dirty="0">
-                <a:latin typeface="Arial" panose="020B0604020202020204" pitchFamily="34" charset="0"/>
-                <a:cs typeface="Arial" panose="020B0604020202020204" pitchFamily="34" charset="0"/>
-              </a:rPr>
-              <a:t>..</a:t>
-            </a:r>
-          </a:p>
-          <a:p>
-            <a:pPr marL="285750" indent="-285750">
-              <a:buClr>
-                <a:schemeClr val="accent6"/>
-              </a:buClr>
-              <a:buSzPct val="120000"/>
-              <a:buFont typeface="Arial" panose="020B0604020202020204" pitchFamily="34" charset="0"/>
-              <a:buChar char="•"/>
-            </a:pPr>
-            <a:r>
-              <a:rPr lang="en-AU" sz="1600" dirty="0">
-                <a:latin typeface="Arial" panose="020B0604020202020204" pitchFamily="34" charset="0"/>
-                <a:cs typeface="Arial" panose="020B0604020202020204" pitchFamily="34" charset="0"/>
-              </a:rPr>
-              <a:t>Lower overall reductions in CO2 possible</a:t>
-            </a:r>
-          </a:p>
-          <a:p>
-            <a:pPr marL="285750" indent="-285750">
-              <a:buClr>
-                <a:schemeClr val="accent6"/>
-              </a:buClr>
-              <a:buSzPct val="120000"/>
-              <a:buFont typeface="Arial" panose="020B0604020202020204" pitchFamily="34" charset="0"/>
-              <a:buChar char="•"/>
-            </a:pPr>
-            <a:endParaRPr lang="en-AU" sz="1600" dirty="0">
-              <a:latin typeface="Arial" panose="020B0604020202020204" pitchFamily="34" charset="0"/>
-              <a:cs typeface="Arial" panose="020B0604020202020204" pitchFamily="34" charset="0"/>
-            </a:endParaRPr>
+            <a:pPr algn="ctr"/>
+            <a:r>
+              <a:rPr lang="en-AU" sz="1200" dirty="0">
+                <a:solidFill>
+                  <a:schemeClr val="tx1">
+                    <a:lumMod val="50000"/>
+                    <a:lumOff val="50000"/>
+                  </a:schemeClr>
+                </a:solidFill>
+                <a:latin typeface="Arial" panose="020B0604020202020204" pitchFamily="34" charset="0"/>
+                <a:cs typeface="Arial" panose="020B0604020202020204" pitchFamily="34" charset="0"/>
+              </a:rPr>
+              <a:t>Testing more of the vehicle</a:t>
+            </a:r>
           </a:p>
         </p:txBody>
       </p:sp>

</xml_diff>